<commit_message>
Updated project presentation PDF and PPTX files
</commit_message>
<xml_diff>
--- a/Presentation.pptx
+++ b/Presentation.pptx
@@ -341,7 +341,7 @@
             <a:fld id="{1D8BD707-D9CF-40AE-B4C6-C98DA3205C09}" type="datetimeFigureOut">
               <a:rPr lang="en-US" smtClean="0"/>
               <a:pPr/>
-              <a:t>6/11/2025</a:t>
+              <a:t>6/12/2025</a:t>
             </a:fld>
             <a:endParaRPr lang="en-US"/>
           </a:p>
@@ -506,7 +506,7 @@
             <a:fld id="{1D8BD707-D9CF-40AE-B4C6-C98DA3205C09}" type="datetimeFigureOut">
               <a:rPr lang="en-US" smtClean="0"/>
               <a:pPr/>
-              <a:t>6/11/2025</a:t>
+              <a:t>6/12/2025</a:t>
             </a:fld>
             <a:endParaRPr lang="en-US"/>
           </a:p>
@@ -681,7 +681,7 @@
             <a:fld id="{1D8BD707-D9CF-40AE-B4C6-C98DA3205C09}" type="datetimeFigureOut">
               <a:rPr lang="en-US" smtClean="0"/>
               <a:pPr/>
-              <a:t>6/11/2025</a:t>
+              <a:t>6/12/2025</a:t>
             </a:fld>
             <a:endParaRPr lang="en-US"/>
           </a:p>
@@ -846,7 +846,7 @@
             <a:fld id="{1D8BD707-D9CF-40AE-B4C6-C98DA3205C09}" type="datetimeFigureOut">
               <a:rPr lang="en-US" smtClean="0"/>
               <a:pPr/>
-              <a:t>6/11/2025</a:t>
+              <a:t>6/12/2025</a:t>
             </a:fld>
             <a:endParaRPr lang="en-US"/>
           </a:p>
@@ -1088,7 +1088,7 @@
             <a:fld id="{1D8BD707-D9CF-40AE-B4C6-C98DA3205C09}" type="datetimeFigureOut">
               <a:rPr lang="en-US" smtClean="0"/>
               <a:pPr/>
-              <a:t>6/11/2025</a:t>
+              <a:t>6/12/2025</a:t>
             </a:fld>
             <a:endParaRPr lang="en-US"/>
           </a:p>
@@ -1370,7 +1370,7 @@
             <a:fld id="{1D8BD707-D9CF-40AE-B4C6-C98DA3205C09}" type="datetimeFigureOut">
               <a:rPr lang="en-US" smtClean="0"/>
               <a:pPr/>
-              <a:t>6/11/2025</a:t>
+              <a:t>6/12/2025</a:t>
             </a:fld>
             <a:endParaRPr lang="en-US"/>
           </a:p>
@@ -1786,7 +1786,7 @@
             <a:fld id="{1D8BD707-D9CF-40AE-B4C6-C98DA3205C09}" type="datetimeFigureOut">
               <a:rPr lang="en-US" smtClean="0"/>
               <a:pPr/>
-              <a:t>6/11/2025</a:t>
+              <a:t>6/12/2025</a:t>
             </a:fld>
             <a:endParaRPr lang="en-US"/>
           </a:p>
@@ -1900,7 +1900,7 @@
             <a:fld id="{1D8BD707-D9CF-40AE-B4C6-C98DA3205C09}" type="datetimeFigureOut">
               <a:rPr lang="en-US" smtClean="0"/>
               <a:pPr/>
-              <a:t>6/11/2025</a:t>
+              <a:t>6/12/2025</a:t>
             </a:fld>
             <a:endParaRPr lang="en-US"/>
           </a:p>
@@ -1992,7 +1992,7 @@
             <a:fld id="{1D8BD707-D9CF-40AE-B4C6-C98DA3205C09}" type="datetimeFigureOut">
               <a:rPr lang="en-US" smtClean="0"/>
               <a:pPr/>
-              <a:t>6/11/2025</a:t>
+              <a:t>6/12/2025</a:t>
             </a:fld>
             <a:endParaRPr lang="en-US"/>
           </a:p>
@@ -2264,7 +2264,7 @@
             <a:fld id="{1D8BD707-D9CF-40AE-B4C6-C98DA3205C09}" type="datetimeFigureOut">
               <a:rPr lang="en-US" smtClean="0"/>
               <a:pPr/>
-              <a:t>6/11/2025</a:t>
+              <a:t>6/12/2025</a:t>
             </a:fld>
             <a:endParaRPr lang="en-US"/>
           </a:p>
@@ -2513,7 +2513,7 @@
             <a:fld id="{1D8BD707-D9CF-40AE-B4C6-C98DA3205C09}" type="datetimeFigureOut">
               <a:rPr lang="en-US" smtClean="0"/>
               <a:pPr/>
-              <a:t>6/11/2025</a:t>
+              <a:t>6/12/2025</a:t>
             </a:fld>
             <a:endParaRPr lang="en-US"/>
           </a:p>
@@ -2721,7 +2721,7 @@
             <a:fld id="{1D8BD707-D9CF-40AE-B4C6-C98DA3205C09}" type="datetimeFigureOut">
               <a:rPr lang="en-US" smtClean="0"/>
               <a:pPr/>
-              <a:t>6/11/2025</a:t>
+              <a:t>6/12/2025</a:t>
             </a:fld>
             <a:endParaRPr lang="en-US"/>
           </a:p>
@@ -12602,52 +12602,6 @@
       </p:sp>
       <p:sp>
         <p:nvSpPr>
-          <p:cNvPr id="7" name="Freeform 7"/>
-          <p:cNvSpPr/>
-          <p:nvPr/>
-        </p:nvSpPr>
-        <p:spPr>
-          <a:xfrm>
-            <a:off x="6915305" y="2026976"/>
-            <a:ext cx="11040788" cy="3772269"/>
-          </a:xfrm>
-          <a:custGeom>
-            <a:avLst/>
-            <a:gdLst/>
-            <a:ahLst/>
-            <a:cxnLst/>
-            <a:rect l="l" t="t" r="r" b="b"/>
-            <a:pathLst>
-              <a:path w="11040788" h="3772269">
-                <a:moveTo>
-                  <a:pt x="0" y="0"/>
-                </a:moveTo>
-                <a:lnTo>
-                  <a:pt x="11040789" y="0"/>
-                </a:lnTo>
-                <a:lnTo>
-                  <a:pt x="11040789" y="3772269"/>
-                </a:lnTo>
-                <a:lnTo>
-                  <a:pt x="0" y="3772269"/>
-                </a:lnTo>
-                <a:lnTo>
-                  <a:pt x="0" y="0"/>
-                </a:lnTo>
-                <a:close/>
-              </a:path>
-            </a:pathLst>
-          </a:custGeom>
-          <a:blipFill>
-            <a:blip r:embed="rId4"/>
-            <a:stretch>
-              <a:fillRect/>
-            </a:stretch>
-          </a:blipFill>
-        </p:spPr>
-      </p:sp>
-      <p:sp>
-        <p:nvSpPr>
           <p:cNvPr id="8" name="TextBox 8"/>
           <p:cNvSpPr txBox="1"/>
           <p:nvPr/>
@@ -12857,6 +12811,42 @@
           </a:p>
         </p:txBody>
       </p:sp>
+      <p:pic>
+        <p:nvPicPr>
+          <p:cNvPr id="15" name="Picture 14">
+            <a:extLst>
+              <a:ext uri="{FF2B5EF4-FFF2-40B4-BE49-F238E27FC236}">
+                <a16:creationId xmlns:a16="http://schemas.microsoft.com/office/drawing/2014/main" id="{0166A1D5-DA81-81C6-D6E6-1EB962270A68}"/>
+              </a:ext>
+            </a:extLst>
+          </p:cNvPr>
+          <p:cNvPicPr>
+            <a:picLocks noChangeAspect="1"/>
+          </p:cNvPicPr>
+          <p:nvPr/>
+        </p:nvPicPr>
+        <p:blipFill>
+          <a:blip r:embed="rId4">
+            <a:extLst>
+              <a:ext uri="{28A0092B-C50C-407E-A947-70E740481C1C}">
+                <a14:useLocalDpi xmlns:a14="http://schemas.microsoft.com/office/drawing/2010/main" val="0"/>
+              </a:ext>
+            </a:extLst>
+          </a:blip>
+          <a:stretch>
+            <a:fillRect/>
+          </a:stretch>
+        </p:blipFill>
+        <p:spPr>
+          <a:xfrm>
+            <a:off x="6975730" y="1847391"/>
+            <a:ext cx="10974572" cy="3227642"/>
+          </a:xfrm>
+          <a:prstGeom prst="rect">
+            <a:avLst/>
+          </a:prstGeom>
+        </p:spPr>
+      </p:pic>
     </p:spTree>
   </p:cSld>
   <p:clrMapOvr>

</xml_diff>